<commit_message>
New Speaker + New Partner
</commit_message>
<xml_diff>
--- a/images/gen.pptx
+++ b/images/gen.pptx
@@ -262,7 +262,7 @@
           <a:p>
             <a:fld id="{07CE0DD0-8E91-4C10-8493-638BB059883F}" type="datetimeFigureOut">
               <a:rPr lang="en-US" smtClean="0"/>
-              <a:t>4/25/2021</a:t>
+              <a:t>5/12/2021</a:t>
             </a:fld>
             <a:endParaRPr lang="en-US"/>
           </a:p>
@@ -460,7 +460,7 @@
           <a:p>
             <a:fld id="{07CE0DD0-8E91-4C10-8493-638BB059883F}" type="datetimeFigureOut">
               <a:rPr lang="en-US" smtClean="0"/>
-              <a:t>4/25/2021</a:t>
+              <a:t>5/12/2021</a:t>
             </a:fld>
             <a:endParaRPr lang="en-US"/>
           </a:p>
@@ -668,7 +668,7 @@
           <a:p>
             <a:fld id="{07CE0DD0-8E91-4C10-8493-638BB059883F}" type="datetimeFigureOut">
               <a:rPr lang="en-US" smtClean="0"/>
-              <a:t>4/25/2021</a:t>
+              <a:t>5/12/2021</a:t>
             </a:fld>
             <a:endParaRPr lang="en-US"/>
           </a:p>
@@ -866,7 +866,7 @@
           <a:p>
             <a:fld id="{07CE0DD0-8E91-4C10-8493-638BB059883F}" type="datetimeFigureOut">
               <a:rPr lang="en-US" smtClean="0"/>
-              <a:t>4/25/2021</a:t>
+              <a:t>5/12/2021</a:t>
             </a:fld>
             <a:endParaRPr lang="en-US"/>
           </a:p>
@@ -1141,7 +1141,7 @@
           <a:p>
             <a:fld id="{07CE0DD0-8E91-4C10-8493-638BB059883F}" type="datetimeFigureOut">
               <a:rPr lang="en-US" smtClean="0"/>
-              <a:t>4/25/2021</a:t>
+              <a:t>5/12/2021</a:t>
             </a:fld>
             <a:endParaRPr lang="en-US"/>
           </a:p>
@@ -1406,7 +1406,7 @@
           <a:p>
             <a:fld id="{07CE0DD0-8E91-4C10-8493-638BB059883F}" type="datetimeFigureOut">
               <a:rPr lang="en-US" smtClean="0"/>
-              <a:t>4/25/2021</a:t>
+              <a:t>5/12/2021</a:t>
             </a:fld>
             <a:endParaRPr lang="en-US"/>
           </a:p>
@@ -1818,7 +1818,7 @@
           <a:p>
             <a:fld id="{07CE0DD0-8E91-4C10-8493-638BB059883F}" type="datetimeFigureOut">
               <a:rPr lang="en-US" smtClean="0"/>
-              <a:t>4/25/2021</a:t>
+              <a:t>5/12/2021</a:t>
             </a:fld>
             <a:endParaRPr lang="en-US"/>
           </a:p>
@@ -1959,7 +1959,7 @@
           <a:p>
             <a:fld id="{07CE0DD0-8E91-4C10-8493-638BB059883F}" type="datetimeFigureOut">
               <a:rPr lang="en-US" smtClean="0"/>
-              <a:t>4/25/2021</a:t>
+              <a:t>5/12/2021</a:t>
             </a:fld>
             <a:endParaRPr lang="en-US"/>
           </a:p>
@@ -2072,7 +2072,7 @@
           <a:p>
             <a:fld id="{07CE0DD0-8E91-4C10-8493-638BB059883F}" type="datetimeFigureOut">
               <a:rPr lang="en-US" smtClean="0"/>
-              <a:t>4/25/2021</a:t>
+              <a:t>5/12/2021</a:t>
             </a:fld>
             <a:endParaRPr lang="en-US"/>
           </a:p>
@@ -2383,7 +2383,7 @@
           <a:p>
             <a:fld id="{07CE0DD0-8E91-4C10-8493-638BB059883F}" type="datetimeFigureOut">
               <a:rPr lang="en-US" smtClean="0"/>
-              <a:t>4/25/2021</a:t>
+              <a:t>5/12/2021</a:t>
             </a:fld>
             <a:endParaRPr lang="en-US"/>
           </a:p>
@@ -2671,7 +2671,7 @@
           <a:p>
             <a:fld id="{07CE0DD0-8E91-4C10-8493-638BB059883F}" type="datetimeFigureOut">
               <a:rPr lang="en-US" smtClean="0"/>
-              <a:t>4/25/2021</a:t>
+              <a:t>5/12/2021</a:t>
             </a:fld>
             <a:endParaRPr lang="en-US"/>
           </a:p>
@@ -2912,7 +2912,7 @@
           <a:p>
             <a:fld id="{07CE0DD0-8E91-4C10-8493-638BB059883F}" type="datetimeFigureOut">
               <a:rPr lang="en-US" smtClean="0"/>
-              <a:t>4/25/2021</a:t>
+              <a:t>5/12/2021</a:t>
             </a:fld>
             <a:endParaRPr lang="en-US"/>
           </a:p>
@@ -3773,7 +3773,7 @@
         </p:blipFill>
         <p:spPr>
           <a:xfrm>
-            <a:off x="3523265" y="868458"/>
+            <a:off x="0" y="593313"/>
             <a:ext cx="5145470" cy="5121084"/>
           </a:xfrm>
           <a:prstGeom prst="rect">
@@ -3781,6 +3781,244 @@
           </a:prstGeom>
         </p:spPr>
       </p:pic>
+      <p:grpSp>
+        <p:nvGrpSpPr>
+          <p:cNvPr id="10" name="Group 9">
+            <a:extLst>
+              <a:ext uri="{FF2B5EF4-FFF2-40B4-BE49-F238E27FC236}">
+                <a16:creationId xmlns:a16="http://schemas.microsoft.com/office/drawing/2014/main" id="{AB4DF244-9E34-4B12-B614-49D3EF6C363B}"/>
+              </a:ext>
+            </a:extLst>
+          </p:cNvPr>
+          <p:cNvGrpSpPr/>
+          <p:nvPr/>
+        </p:nvGrpSpPr>
+        <p:grpSpPr>
+          <a:xfrm>
+            <a:off x="6469158" y="593313"/>
+            <a:ext cx="5145470" cy="5121084"/>
+            <a:chOff x="3126351" y="1387791"/>
+            <a:chExt cx="5145470" cy="5121084"/>
+          </a:xfrm>
+        </p:grpSpPr>
+        <p:sp>
+          <p:nvSpPr>
+            <p:cNvPr id="2" name="Rectangle 1">
+              <a:extLst>
+                <a:ext uri="{FF2B5EF4-FFF2-40B4-BE49-F238E27FC236}">
+                  <a16:creationId xmlns:a16="http://schemas.microsoft.com/office/drawing/2014/main" id="{C6AEB176-9AC0-4A2C-B41B-9C7363526865}"/>
+                </a:ext>
+              </a:extLst>
+            </p:cNvPr>
+            <p:cNvSpPr/>
+            <p:nvPr/>
+          </p:nvSpPr>
+          <p:spPr>
+            <a:xfrm>
+              <a:off x="3126351" y="1387791"/>
+              <a:ext cx="5145470" cy="5121084"/>
+            </a:xfrm>
+            <a:prstGeom prst="rect">
+              <a:avLst/>
+            </a:prstGeom>
+            <a:solidFill>
+              <a:schemeClr val="bg1"/>
+            </a:solidFill>
+            <a:ln>
+              <a:noFill/>
+            </a:ln>
+          </p:spPr>
+          <p:style>
+            <a:lnRef idx="2">
+              <a:schemeClr val="accent1">
+                <a:shade val="50000"/>
+              </a:schemeClr>
+            </a:lnRef>
+            <a:fillRef idx="1">
+              <a:schemeClr val="accent1"/>
+            </a:fillRef>
+            <a:effectRef idx="0">
+              <a:schemeClr val="accent1"/>
+            </a:effectRef>
+            <a:fontRef idx="minor">
+              <a:schemeClr val="lt1"/>
+            </a:fontRef>
+          </p:style>
+          <p:txBody>
+            <a:bodyPr rtlCol="0" anchor="ctr"/>
+            <a:lstStyle/>
+            <a:p>
+              <a:pPr algn="ctr"/>
+              <a:endParaRPr lang="en-US"/>
+            </a:p>
+          </p:txBody>
+        </p:sp>
+        <p:grpSp>
+          <p:nvGrpSpPr>
+            <p:cNvPr id="9" name="Group 8">
+              <a:extLst>
+                <a:ext uri="{FF2B5EF4-FFF2-40B4-BE49-F238E27FC236}">
+                  <a16:creationId xmlns:a16="http://schemas.microsoft.com/office/drawing/2014/main" id="{0FAFB1B8-42C5-4308-B014-529E402CAB74}"/>
+                </a:ext>
+              </a:extLst>
+            </p:cNvPr>
+            <p:cNvGrpSpPr/>
+            <p:nvPr/>
+          </p:nvGrpSpPr>
+          <p:grpSpPr>
+            <a:xfrm>
+              <a:off x="3852813" y="2163573"/>
+              <a:ext cx="3730187" cy="2851574"/>
+              <a:chOff x="3852813" y="2478367"/>
+              <a:chExt cx="3730187" cy="2851574"/>
+            </a:xfrm>
+          </p:grpSpPr>
+          <p:pic>
+            <p:nvPicPr>
+              <p:cNvPr id="5" name="Picture 4" descr="No photo description available.">
+                <a:extLst>
+                  <a:ext uri="{FF2B5EF4-FFF2-40B4-BE49-F238E27FC236}">
+                    <a16:creationId xmlns:a16="http://schemas.microsoft.com/office/drawing/2014/main" id="{5BE9ACD5-8611-4C5E-964E-443CE09259F7}"/>
+                  </a:ext>
+                </a:extLst>
+              </p:cNvPr>
+              <p:cNvPicPr>
+                <a:picLocks noChangeAspect="1" noChangeArrowheads="1"/>
+              </p:cNvPicPr>
+              <p:nvPr/>
+            </p:nvPicPr>
+            <p:blipFill rotWithShape="1">
+              <a:blip r:embed="rId3">
+                <a:extLst>
+                  <a:ext uri="{BEBA8EAE-BF5A-486C-A8C5-ECC9F3942E4B}">
+                    <a14:imgProps xmlns:a14="http://schemas.microsoft.com/office/drawing/2010/main">
+                      <a14:imgLayer r:embed="rId4">
+                        <a14:imgEffect>
+                          <a14:backgroundRemoval t="10000" b="90000" l="10000" r="90000">
+                            <a14:foregroundMark x1="42222" y1="39653" x2="42222" y2="40208"/>
+                            <a14:foregroundMark x1="56667" y1="43819" x2="56667" y2="43819"/>
+                            <a14:backgroundMark x1="46875" y1="54792" x2="46875" y2="54792"/>
+                          </a14:backgroundRemoval>
+                        </a14:imgEffect>
+                      </a14:imgLayer>
+                    </a14:imgProps>
+                  </a:ext>
+                  <a:ext uri="{28A0092B-C50C-407E-A947-70E740481C1C}">
+                    <a14:useLocalDpi xmlns:a14="http://schemas.microsoft.com/office/drawing/2010/main" val="0"/>
+                  </a:ext>
+                </a:extLst>
+              </a:blip>
+              <a:srcRect l="38000" t="36285" r="37833" b="38672"/>
+              <a:stretch/>
+            </p:blipFill>
+            <p:spPr bwMode="auto">
+              <a:xfrm>
+                <a:off x="4806243" y="2478367"/>
+                <a:ext cx="1834746" cy="1901266"/>
+              </a:xfrm>
+              <a:prstGeom prst="rect">
+                <a:avLst/>
+              </a:prstGeom>
+              <a:noFill/>
+              <a:extLst>
+                <a:ext uri="{909E8E84-426E-40DD-AFC4-6F175D3DCCD1}">
+                  <a14:hiddenFill xmlns:a14="http://schemas.microsoft.com/office/drawing/2010/main">
+                    <a:solidFill>
+                      <a:srgbClr val="FFFFFF"/>
+                    </a:solidFill>
+                  </a14:hiddenFill>
+                </a:ext>
+              </a:extLst>
+            </p:spPr>
+          </p:pic>
+          <p:sp>
+            <p:nvSpPr>
+              <p:cNvPr id="7" name="Rectangle 6">
+                <a:extLst>
+                  <a:ext uri="{FF2B5EF4-FFF2-40B4-BE49-F238E27FC236}">
+                    <a16:creationId xmlns:a16="http://schemas.microsoft.com/office/drawing/2014/main" id="{3410C7FA-1746-4FFF-BEFD-2488014570DB}"/>
+                  </a:ext>
+                </a:extLst>
+              </p:cNvPr>
+              <p:cNvSpPr/>
+              <p:nvPr/>
+            </p:nvSpPr>
+            <p:spPr>
+              <a:xfrm>
+                <a:off x="3864449" y="4263127"/>
+                <a:ext cx="3669274" cy="662200"/>
+              </a:xfrm>
+              <a:prstGeom prst="rect">
+                <a:avLst/>
+              </a:prstGeom>
+              <a:noFill/>
+            </p:spPr>
+            <p:txBody>
+              <a:bodyPr wrap="none" lIns="107156" tIns="53578" rIns="107156" bIns="53578">
+                <a:spAutoFit/>
+              </a:bodyPr>
+              <a:lstStyle/>
+              <a:p>
+                <a:pPr algn="ctr"/>
+                <a:r>
+                  <a:rPr lang="en-US" sz="3600" dirty="0">
+                    <a:ln w="0">
+                      <a:solidFill>
+                        <a:schemeClr val="tx1"/>
+                      </a:solidFill>
+                    </a:ln>
+                    <a:latin typeface="Montserrat" panose="00000500000000000000" pitchFamily="2" charset="0"/>
+                  </a:rPr>
+                  <a:t>VISION GREEN</a:t>
+                </a:r>
+              </a:p>
+            </p:txBody>
+          </p:sp>
+          <p:sp>
+            <p:nvSpPr>
+              <p:cNvPr id="8" name="Rectangle 7">
+                <a:extLst>
+                  <a:ext uri="{FF2B5EF4-FFF2-40B4-BE49-F238E27FC236}">
+                    <a16:creationId xmlns:a16="http://schemas.microsoft.com/office/drawing/2014/main" id="{084A2574-2AD5-49D3-B47E-77747F6256C7}"/>
+                  </a:ext>
+                </a:extLst>
+              </p:cNvPr>
+              <p:cNvSpPr/>
+              <p:nvPr/>
+            </p:nvSpPr>
+            <p:spPr>
+              <a:xfrm>
+                <a:off x="3852813" y="4698518"/>
+                <a:ext cx="3730187" cy="631423"/>
+              </a:xfrm>
+              <a:prstGeom prst="rect">
+                <a:avLst/>
+              </a:prstGeom>
+              <a:noFill/>
+            </p:spPr>
+            <p:txBody>
+              <a:bodyPr wrap="none" lIns="107156" tIns="53578" rIns="107156" bIns="53578">
+                <a:spAutoFit/>
+              </a:bodyPr>
+              <a:lstStyle/>
+              <a:p>
+                <a:pPr algn="ctr"/>
+                <a:r>
+                  <a:rPr lang="en-US" sz="3300" dirty="0">
+                    <a:ln w="0">
+                      <a:solidFill>
+                        <a:schemeClr val="tx1"/>
+                      </a:solidFill>
+                    </a:ln>
+                    <a:latin typeface="Montserrat" panose="00000500000000000000" pitchFamily="2" charset="0"/>
+                  </a:rPr>
+                  <a:t>ORGANIZATION</a:t>
+                </a:r>
+              </a:p>
+            </p:txBody>
+          </p:sp>
+        </p:grpSp>
+      </p:grpSp>
     </p:spTree>
     <p:extLst>
       <p:ext uri="{BB962C8B-B14F-4D97-AF65-F5344CB8AC3E}">

</xml_diff>